<commit_message>
Added Braiden's use case
</commit_message>
<xml_diff>
--- a/presentations/C-team_presentation_9-20.pptx
+++ b/presentations/C-team_presentation_9-20.pptx
@@ -15,8 +15,7 @@
     <p:sldId id="262" r:id="rId9"/>
     <p:sldId id="263" r:id="rId10"/>
     <p:sldId id="264" r:id="rId11"/>
-    <p:sldId id="265" r:id="rId12"/>
-    <p:sldId id="266" r:id="rId13"/>
+    <p:sldId id="266" r:id="rId12"/>
   </p:sldIdLst>
   <p:sldSz cx="12192000" cy="6858000"/>
   <p:notesSz cx="6858000" cy="9144000"/>
@@ -3347,6 +3346,10 @@
           </a:bodyPr>
           <a:lstStyle/>
           <a:p>
+            <a:r>
+              <a:rPr lang="en-IN" dirty="0"/>
+              <a:t/>
+            </a:r>
             <a:br>
               <a:rPr lang="en-IN" dirty="0"/>
             </a:br>
@@ -3354,9 +3357,17 @@
               <a:rPr lang="en-IN" sz="3600" dirty="0"/>
               <a:t>PROJECT JUNGLE</a:t>
             </a:r>
+            <a:r>
+              <a:rPr lang="en-IN" dirty="0"/>
+              <a:t/>
+            </a:r>
             <a:br>
               <a:rPr lang="en-IN" dirty="0"/>
             </a:br>
+            <a:r>
+              <a:rPr lang="en-IN" dirty="0"/>
+              <a:t/>
+            </a:r>
             <a:br>
               <a:rPr lang="en-IN" dirty="0"/>
             </a:br>
@@ -3364,9 +3375,17 @@
               <a:rPr lang="en-IN" sz="2700" dirty="0"/>
               <a:t>Presentation-1</a:t>
             </a:r>
+            <a:r>
+              <a:rPr lang="en-IN" dirty="0"/>
+              <a:t/>
+            </a:r>
             <a:br>
               <a:rPr lang="en-IN" dirty="0"/>
             </a:br>
+            <a:r>
+              <a:rPr lang="en-IN" dirty="0"/>
+              <a:t/>
+            </a:r>
             <a:br>
               <a:rPr lang="en-IN" dirty="0"/>
             </a:br>
@@ -3524,9 +3543,16 @@
             <p:ph type="title"/>
           </p:nvPr>
         </p:nvSpPr>
-        <p:spPr/>
-        <p:txBody>
-          <a:bodyPr/>
+        <p:spPr>
+          <a:xfrm>
+            <a:off x="2239928" y="120635"/>
+            <a:ext cx="7729728" cy="688257"/>
+          </a:xfrm>
+        </p:spPr>
+        <p:txBody>
+          <a:bodyPr>
+            <a:normAutofit fontScale="90000"/>
+          </a:bodyPr>
           <a:lstStyle/>
           <a:p>
             <a:r>
@@ -3536,31 +3562,32 @@
           </a:p>
         </p:txBody>
       </p:sp>
-      <p:sp>
-        <p:nvSpPr>
-          <p:cNvPr id="3" name="Content Placeholder 2">
-            <a:extLst>
-              <a:ext uri="{FF2B5EF4-FFF2-40B4-BE49-F238E27FC236}">
-                <a16:creationId xmlns:a16="http://schemas.microsoft.com/office/drawing/2014/main" id="{7E700A81-A586-416A-87FB-C89897ED7838}"/>
-              </a:ext>
-            </a:extLst>
-          </p:cNvPr>
-          <p:cNvSpPr>
-            <a:spLocks noGrp="1"/>
-          </p:cNvSpPr>
+      <p:pic>
+        <p:nvPicPr>
+          <p:cNvPr id="4" name="Content Placeholder 3"/>
+          <p:cNvPicPr>
+            <a:picLocks noGrp="1" noChangeAspect="1"/>
+          </p:cNvPicPr>
           <p:nvPr>
             <p:ph idx="1"/>
           </p:nvPr>
-        </p:nvSpPr>
-        <p:spPr/>
-        <p:txBody>
-          <a:bodyPr/>
-          <a:lstStyle/>
-          <a:p>
-            <a:endParaRPr lang="en-IN"/>
-          </a:p>
-        </p:txBody>
-      </p:sp>
+        </p:nvPicPr>
+        <p:blipFill>
+          <a:blip r:embed="rId2"/>
+          <a:stretch>
+            <a:fillRect/>
+          </a:stretch>
+        </p:blipFill>
+        <p:spPr>
+          <a:xfrm>
+            <a:off x="2649161" y="1055077"/>
+            <a:ext cx="6911261" cy="4324839"/>
+          </a:xfrm>
+          <a:prstGeom prst="rect">
+            <a:avLst/>
+          </a:prstGeom>
+        </p:spPr>
+      </p:pic>
     </p:spTree>
     <p:extLst>
       <p:ext uri="{BB962C8B-B14F-4D97-AF65-F5344CB8AC3E}">
@@ -3575,89 +3602,6 @@
 </file>
 
 <file path=ppt/slides/slide11.xml><?xml version="1.0" encoding="utf-8"?>
-<p:sld xmlns:a="http://schemas.openxmlformats.org/drawingml/2006/main" xmlns:r="http://schemas.openxmlformats.org/officeDocument/2006/relationships" xmlns:p="http://schemas.openxmlformats.org/presentationml/2006/main">
-  <p:cSld>
-    <p:spTree>
-      <p:nvGrpSpPr>
-        <p:cNvPr id="1" name=""/>
-        <p:cNvGrpSpPr/>
-        <p:nvPr/>
-      </p:nvGrpSpPr>
-      <p:grpSpPr>
-        <a:xfrm>
-          <a:off x="0" y="0"/>
-          <a:ext cx="0" cy="0"/>
-          <a:chOff x="0" y="0"/>
-          <a:chExt cx="0" cy="0"/>
-        </a:xfrm>
-      </p:grpSpPr>
-      <p:sp>
-        <p:nvSpPr>
-          <p:cNvPr id="2" name="Title 1">
-            <a:extLst>
-              <a:ext uri="{FF2B5EF4-FFF2-40B4-BE49-F238E27FC236}">
-                <a16:creationId xmlns:a16="http://schemas.microsoft.com/office/drawing/2014/main" id="{9CD336A2-5AC9-4A03-996C-0E3C3FE675C9}"/>
-              </a:ext>
-            </a:extLst>
-          </p:cNvPr>
-          <p:cNvSpPr>
-            <a:spLocks noGrp="1"/>
-          </p:cNvSpPr>
-          <p:nvPr>
-            <p:ph type="title"/>
-          </p:nvPr>
-        </p:nvSpPr>
-        <p:spPr/>
-        <p:txBody>
-          <a:bodyPr/>
-          <a:lstStyle/>
-          <a:p>
-            <a:r>
-              <a:rPr lang="en-IN" dirty="0"/>
-              <a:t>Use case-4</a:t>
-            </a:r>
-          </a:p>
-        </p:txBody>
-      </p:sp>
-      <p:sp>
-        <p:nvSpPr>
-          <p:cNvPr id="3" name="Content Placeholder 2">
-            <a:extLst>
-              <a:ext uri="{FF2B5EF4-FFF2-40B4-BE49-F238E27FC236}">
-                <a16:creationId xmlns:a16="http://schemas.microsoft.com/office/drawing/2014/main" id="{B1BE280F-B444-4FB6-9D62-F6D0C100EA9D}"/>
-              </a:ext>
-            </a:extLst>
-          </p:cNvPr>
-          <p:cNvSpPr>
-            <a:spLocks noGrp="1"/>
-          </p:cNvSpPr>
-          <p:nvPr>
-            <p:ph idx="1"/>
-          </p:nvPr>
-        </p:nvSpPr>
-        <p:spPr/>
-        <p:txBody>
-          <a:bodyPr/>
-          <a:lstStyle/>
-          <a:p>
-            <a:endParaRPr lang="en-IN"/>
-          </a:p>
-        </p:txBody>
-      </p:sp>
-    </p:spTree>
-    <p:extLst>
-      <p:ext uri="{BB962C8B-B14F-4D97-AF65-F5344CB8AC3E}">
-        <p14:creationId xmlns:p14="http://schemas.microsoft.com/office/powerpoint/2010/main" val="2115534801"/>
-      </p:ext>
-    </p:extLst>
-  </p:cSld>
-  <p:clrMapOvr>
-    <a:masterClrMapping/>
-  </p:clrMapOvr>
-</p:sld>
-</file>
-
-<file path=ppt/slides/slide12.xml><?xml version="1.0" encoding="utf-8"?>
 <p:sld xmlns:a="http://schemas.openxmlformats.org/drawingml/2006/main" xmlns:r="http://schemas.openxmlformats.org/officeDocument/2006/relationships" xmlns:p="http://schemas.openxmlformats.org/presentationml/2006/main">
   <p:cSld>
     <p:spTree>
@@ -4297,7 +4241,7 @@
                 <a16:creationId xmlns:a16="http://schemas.microsoft.com/office/drawing/2014/main" id="{195A7738-D4D9-4E15-A635-CA28918C1A35}"/>
               </a:ext>
               <a:ext uri="{C183D7F6-B498-43B3-948B-1728B52AA6E4}">
-                <adec:decorative xmlns:adec="http://schemas.microsoft.com/office/drawing/2017/decorative" val="1"/>
+                <adec:decorative xmlns:adec="http://schemas.microsoft.com/office/drawing/2017/decorative" xmlns="" val="1"/>
               </a:ext>
             </a:extLst>
           </p:cNvPr>
@@ -4360,7 +4304,7 @@
                 <a16:creationId xmlns:a16="http://schemas.microsoft.com/office/drawing/2014/main" id="{F813E79E-894E-4011-B4B0-93B31C4E1F86}"/>
               </a:ext>
               <a:ext uri="{C183D7F6-B498-43B3-948B-1728B52AA6E4}">
-                <adec:decorative xmlns:adec="http://schemas.microsoft.com/office/drawing/2017/decorative" val="1"/>
+                <adec:decorative xmlns:adec="http://schemas.microsoft.com/office/drawing/2017/decorative" xmlns="" val="1"/>
               </a:ext>
             </a:extLst>
           </p:cNvPr>
@@ -4424,7 +4368,7 @@
                 <a16:creationId xmlns:a16="http://schemas.microsoft.com/office/drawing/2014/main" id="{F31DDD9C-2B95-4688-9DD6-D3AC34FF9EFE}"/>
               </a:ext>
               <a:ext uri="{C183D7F6-B498-43B3-948B-1728B52AA6E4}">
-                <adec:decorative xmlns:adec="http://schemas.microsoft.com/office/drawing/2017/decorative" val="1"/>
+                <adec:decorative xmlns:adec="http://schemas.microsoft.com/office/drawing/2017/decorative" xmlns="" val="1"/>
               </a:ext>
             </a:extLst>
           </p:cNvPr>

</xml_diff>